<commit_message>
Add n to example PDP stream. Add various discussion relating to goals.
</commit_message>
<xml_diff>
--- a/fig/pdp_stream.pptx
+++ b/fig/pdp_stream.pptx
@@ -12822,7 +12822,7 @@
         <p:spPr>
           <a:xfrm>
             <a:off x="8720244" y="6065468"/>
-            <a:ext cx="364202" cy="276999"/>
+            <a:ext cx="357790" cy="276999"/>
           </a:xfrm>
           <a:prstGeom prst="rect">
             <a:avLst/>
@@ -12836,7 +12836,7 @@
           <a:lstStyle/>
           <a:p>
             <a:r>
-              <a:rPr lang="en-US" sz="1200" dirty="0">
+              <a:rPr lang="en-US" sz="1200">
                 <a:solidFill>
                   <a:schemeClr val="accent4">
                     <a:lumMod val="20000"/>
@@ -12844,8 +12844,16 @@
                   </a:schemeClr>
                 </a:solidFill>
               </a:rPr>
-              <a:t>+1</a:t>
-            </a:r>
+              <a:t>+n</a:t>
+            </a:r>
+            <a:endParaRPr lang="en-US" sz="1200" dirty="0">
+              <a:solidFill>
+                <a:schemeClr val="accent4">
+                  <a:lumMod val="20000"/>
+                  <a:lumOff val="80000"/>
+                </a:schemeClr>
+              </a:solidFill>
+            </a:endParaRPr>
           </a:p>
         </p:txBody>
       </p:sp>

</xml_diff>